<commit_message>
added LoRa TX instructions
</commit_message>
<xml_diff>
--- a/Lora.pptx
+++ b/Lora.pptx
@@ -5,7 +5,7 @@
     <p:sldMasterId id="2147483660" r:id="rId1"/>
   </p:sldMasterIdLst>
   <p:notesMasterIdLst>
-    <p:notesMasterId r:id="rId22"/>
+    <p:notesMasterId r:id="rId23"/>
   </p:notesMasterIdLst>
   <p:sldIdLst>
     <p:sldId id="256" r:id="rId2"/>
@@ -24,10 +24,11 @@
     <p:sldId id="271" r:id="rId15"/>
     <p:sldId id="285" r:id="rId16"/>
     <p:sldId id="303" r:id="rId17"/>
-    <p:sldId id="272" r:id="rId18"/>
-    <p:sldId id="270" r:id="rId19"/>
-    <p:sldId id="301" r:id="rId20"/>
-    <p:sldId id="299" r:id="rId21"/>
+    <p:sldId id="304" r:id="rId18"/>
+    <p:sldId id="272" r:id="rId19"/>
+    <p:sldId id="270" r:id="rId20"/>
+    <p:sldId id="301" r:id="rId21"/>
+    <p:sldId id="299" r:id="rId22"/>
   </p:sldIdLst>
   <p:sldSz cx="12192000" cy="6858000"/>
   <p:notesSz cx="6858000" cy="9144000"/>
@@ -55155,6 +55156,416 @@
           <p:cNvPr id="2" name="Title 1">
             <a:extLst>
               <a:ext uri="{FF2B5EF4-FFF2-40B4-BE49-F238E27FC236}">
+                <a16:creationId xmlns:a16="http://schemas.microsoft.com/office/drawing/2014/main" id="{4675A003-E534-4CDF-A01F-5FE3DE7F5E4F}"/>
+              </a:ext>
+            </a:extLst>
+          </p:cNvPr>
+          <p:cNvSpPr>
+            <a:spLocks noGrp="1"/>
+          </p:cNvSpPr>
+          <p:nvPr>
+            <p:ph type="title"/>
+          </p:nvPr>
+        </p:nvSpPr>
+        <p:spPr/>
+        <p:txBody>
+          <a:bodyPr/>
+          <a:lstStyle/>
+          <a:p>
+            <a:r>
+              <a:rPr lang="en-US" dirty="0"/>
+              <a:t>Open </a:t>
+            </a:r>
+            <a:r>
+              <a:rPr lang="en-US" dirty="0" err="1"/>
+              <a:t>LoRa_TX.ino</a:t>
+            </a:r>
+            <a:endParaRPr lang="en-US" dirty="0"/>
+          </a:p>
+        </p:txBody>
+      </p:sp>
+      <p:sp>
+        <p:nvSpPr>
+          <p:cNvPr id="10" name="TextBox 9">
+            <a:extLst>
+              <a:ext uri="{FF2B5EF4-FFF2-40B4-BE49-F238E27FC236}">
+                <a16:creationId xmlns:a16="http://schemas.microsoft.com/office/drawing/2014/main" id="{3C1C83A7-15A0-F981-D702-A0628900D55A}"/>
+              </a:ext>
+            </a:extLst>
+          </p:cNvPr>
+          <p:cNvSpPr txBox="1"/>
+          <p:nvPr/>
+        </p:nvSpPr>
+        <p:spPr>
+          <a:xfrm>
+            <a:off x="2109945" y="1717040"/>
+            <a:ext cx="7842800" cy="1169551"/>
+          </a:xfrm>
+          <a:prstGeom prst="rect">
+            <a:avLst/>
+          </a:prstGeom>
+          <a:noFill/>
+        </p:spPr>
+        <p:txBody>
+          <a:bodyPr wrap="square" rtlCol="0">
+            <a:spAutoFit/>
+          </a:bodyPr>
+          <a:lstStyle/>
+          <a:p>
+            <a:pPr marL="285750" indent="-285750">
+              <a:buClr>
+                <a:schemeClr val="tx1"/>
+              </a:buClr>
+              <a:buFont typeface="Arial" panose="020B0604020202020204" pitchFamily="34" charset="0"/>
+              <a:buChar char="•"/>
+            </a:pPr>
+            <a:r>
+              <a:rPr lang="en-US" dirty="0">
+                <a:solidFill>
+                  <a:schemeClr val="tx1"/>
+                </a:solidFill>
+              </a:rPr>
+              <a:t>Open the </a:t>
+            </a:r>
+            <a:r>
+              <a:rPr lang="en-US" dirty="0" err="1">
+                <a:solidFill>
+                  <a:schemeClr val="tx1"/>
+                </a:solidFill>
+              </a:rPr>
+              <a:t>LoRa_TX.ino</a:t>
+            </a:r>
+            <a:r>
+              <a:rPr lang="en-US" dirty="0">
+                <a:solidFill>
+                  <a:schemeClr val="tx1"/>
+                </a:solidFill>
+              </a:rPr>
+              <a:t> file from your extracted zip folder.</a:t>
+            </a:r>
+          </a:p>
+          <a:p>
+            <a:pPr marL="285750" indent="-285750">
+              <a:buClr>
+                <a:schemeClr val="tx1"/>
+              </a:buClr>
+              <a:buFont typeface="Arial" panose="020B0604020202020204" pitchFamily="34" charset="0"/>
+              <a:buChar char="•"/>
+            </a:pPr>
+            <a:r>
+              <a:rPr lang="en-US" dirty="0">
+                <a:solidFill>
+                  <a:schemeClr val="tx1"/>
+                </a:solidFill>
+              </a:rPr>
+              <a:t>Click the check mark to compile and ensure the libraries are installed correctly.</a:t>
+            </a:r>
+          </a:p>
+          <a:p>
+            <a:pPr marL="285750" indent="-285750">
+              <a:buClr>
+                <a:schemeClr val="tx1"/>
+              </a:buClr>
+              <a:buFont typeface="Arial" panose="020B0604020202020204" pitchFamily="34" charset="0"/>
+              <a:buChar char="•"/>
+            </a:pPr>
+            <a:r>
+              <a:rPr lang="en-US" dirty="0">
+                <a:solidFill>
+                  <a:schemeClr val="tx1"/>
+                </a:solidFill>
+              </a:rPr>
+              <a:t>Click the right arrow to upload the program to the Arduino Nano.</a:t>
+            </a:r>
+          </a:p>
+          <a:p>
+            <a:pPr marL="285750" indent="-285750">
+              <a:buClr>
+                <a:schemeClr val="tx1"/>
+              </a:buClr>
+              <a:buFont typeface="Arial" panose="020B0604020202020204" pitchFamily="34" charset="0"/>
+              <a:buChar char="•"/>
+            </a:pPr>
+            <a:r>
+              <a:rPr lang="en-US" dirty="0">
+                <a:solidFill>
+                  <a:schemeClr val="tx1"/>
+                </a:solidFill>
+              </a:rPr>
+              <a:t>Open the serial monitor to ensure the DHT-11 and Lora radio modules are communicating with the Nano.</a:t>
+            </a:r>
+          </a:p>
+        </p:txBody>
+      </p:sp>
+      <p:pic>
+        <p:nvPicPr>
+          <p:cNvPr id="4" name="Picture 3">
+            <a:extLst>
+              <a:ext uri="{FF2B5EF4-FFF2-40B4-BE49-F238E27FC236}">
+                <a16:creationId xmlns:a16="http://schemas.microsoft.com/office/drawing/2014/main" id="{F66B5AA3-31F0-9CF5-A573-571F0BC03980}"/>
+              </a:ext>
+            </a:extLst>
+          </p:cNvPr>
+          <p:cNvPicPr>
+            <a:picLocks noChangeAspect="1"/>
+          </p:cNvPicPr>
+          <p:nvPr/>
+        </p:nvPicPr>
+        <p:blipFill>
+          <a:blip r:embed="rId2"/>
+          <a:stretch>
+            <a:fillRect/>
+          </a:stretch>
+        </p:blipFill>
+        <p:spPr>
+          <a:xfrm>
+            <a:off x="2669310" y="2957625"/>
+            <a:ext cx="6486957" cy="3649872"/>
+          </a:xfrm>
+          <a:prstGeom prst="rect">
+            <a:avLst/>
+          </a:prstGeom>
+        </p:spPr>
+      </p:pic>
+      <p:sp>
+        <p:nvSpPr>
+          <p:cNvPr id="5" name="Arrow: Left 4">
+            <a:extLst>
+              <a:ext uri="{FF2B5EF4-FFF2-40B4-BE49-F238E27FC236}">
+                <a16:creationId xmlns:a16="http://schemas.microsoft.com/office/drawing/2014/main" id="{8FE40019-010B-3512-0241-40AA60C54E58}"/>
+              </a:ext>
+            </a:extLst>
+          </p:cNvPr>
+          <p:cNvSpPr/>
+          <p:nvPr/>
+        </p:nvSpPr>
+        <p:spPr>
+          <a:xfrm rot="9183022">
+            <a:off x="1546765" y="3516422"/>
+            <a:ext cx="1255670" cy="275308"/>
+          </a:xfrm>
+          <a:prstGeom prst="leftArrow">
+            <a:avLst/>
+          </a:prstGeom>
+          <a:solidFill>
+            <a:srgbClr val="FF0000"/>
+          </a:solidFill>
+          <a:ln>
+            <a:solidFill>
+              <a:srgbClr val="FF0000"/>
+            </a:solidFill>
+          </a:ln>
+        </p:spPr>
+        <p:style>
+          <a:lnRef idx="2">
+            <a:schemeClr val="accent1">
+              <a:shade val="15000"/>
+            </a:schemeClr>
+          </a:lnRef>
+          <a:fillRef idx="1">
+            <a:schemeClr val="accent1"/>
+          </a:fillRef>
+          <a:effectRef idx="0">
+            <a:schemeClr val="accent1"/>
+          </a:effectRef>
+          <a:fontRef idx="minor">
+            <a:schemeClr val="lt1"/>
+          </a:fontRef>
+        </p:style>
+        <p:txBody>
+          <a:bodyPr rtlCol="0" anchor="ctr"/>
+          <a:lstStyle/>
+          <a:p>
+            <a:pPr algn="ctr"/>
+            <a:endParaRPr lang="en-US"/>
+          </a:p>
+        </p:txBody>
+      </p:sp>
+      <p:sp>
+        <p:nvSpPr>
+          <p:cNvPr id="7" name="Rectangle 6">
+            <a:extLst>
+              <a:ext uri="{FF2B5EF4-FFF2-40B4-BE49-F238E27FC236}">
+                <a16:creationId xmlns:a16="http://schemas.microsoft.com/office/drawing/2014/main" id="{62108D22-B13B-5D9D-E7EE-6A94DA4B0482}"/>
+              </a:ext>
+            </a:extLst>
+          </p:cNvPr>
+          <p:cNvSpPr/>
+          <p:nvPr/>
+        </p:nvSpPr>
+        <p:spPr>
+          <a:xfrm>
+            <a:off x="983171" y="3674537"/>
+            <a:ext cx="569387" cy="923330"/>
+          </a:xfrm>
+          <a:prstGeom prst="rect">
+            <a:avLst/>
+          </a:prstGeom>
+          <a:noFill/>
+        </p:spPr>
+        <p:txBody>
+          <a:bodyPr wrap="none" lIns="91440" tIns="45720" rIns="91440" bIns="45720">
+            <a:spAutoFit/>
+          </a:bodyPr>
+          <a:lstStyle/>
+          <a:p>
+            <a:pPr algn="ctr"/>
+            <a:r>
+              <a:rPr lang="en-US" sz="5400" b="0" cap="none" spc="0" dirty="0">
+                <a:ln w="0"/>
+                <a:solidFill>
+                  <a:schemeClr val="tx1"/>
+                </a:solidFill>
+                <a:effectLst>
+                  <a:outerShdw blurRad="38100" dist="25400" dir="5400000" algn="ctr" rotWithShape="0">
+                    <a:srgbClr val="6E747A">
+                      <a:alpha val="43000"/>
+                    </a:srgbClr>
+                  </a:outerShdw>
+                </a:effectLst>
+              </a:rPr>
+              <a:t>1</a:t>
+            </a:r>
+          </a:p>
+        </p:txBody>
+      </p:sp>
+      <p:sp>
+        <p:nvSpPr>
+          <p:cNvPr id="16" name="Rectangle 15">
+            <a:extLst>
+              <a:ext uri="{FF2B5EF4-FFF2-40B4-BE49-F238E27FC236}">
+                <a16:creationId xmlns:a16="http://schemas.microsoft.com/office/drawing/2014/main" id="{972E6743-F5FE-5695-138A-141C57854ED8}"/>
+              </a:ext>
+            </a:extLst>
+          </p:cNvPr>
+          <p:cNvSpPr/>
+          <p:nvPr/>
+        </p:nvSpPr>
+        <p:spPr>
+          <a:xfrm>
+            <a:off x="1815383" y="4678304"/>
+            <a:ext cx="569387" cy="923330"/>
+          </a:xfrm>
+          <a:prstGeom prst="rect">
+            <a:avLst/>
+          </a:prstGeom>
+          <a:noFill/>
+        </p:spPr>
+        <p:txBody>
+          <a:bodyPr wrap="none" lIns="91440" tIns="45720" rIns="91440" bIns="45720">
+            <a:spAutoFit/>
+          </a:bodyPr>
+          <a:lstStyle/>
+          <a:p>
+            <a:pPr algn="ctr"/>
+            <a:r>
+              <a:rPr lang="en-US" sz="5400" b="0" cap="none" spc="0" dirty="0">
+                <a:ln w="0"/>
+                <a:solidFill>
+                  <a:schemeClr val="tx1"/>
+                </a:solidFill>
+                <a:effectLst>
+                  <a:outerShdw blurRad="38100" dist="25400" dir="5400000" algn="ctr" rotWithShape="0">
+                    <a:srgbClr val="6E747A">
+                      <a:alpha val="43000"/>
+                    </a:srgbClr>
+                  </a:outerShdw>
+                </a:effectLst>
+              </a:rPr>
+              <a:t>2</a:t>
+            </a:r>
+          </a:p>
+        </p:txBody>
+      </p:sp>
+      <p:sp>
+        <p:nvSpPr>
+          <p:cNvPr id="17" name="Arrow: Left 16">
+            <a:extLst>
+              <a:ext uri="{FF2B5EF4-FFF2-40B4-BE49-F238E27FC236}">
+                <a16:creationId xmlns:a16="http://schemas.microsoft.com/office/drawing/2014/main" id="{746D5C25-493F-070D-7DEF-3F6B492109E5}"/>
+              </a:ext>
+            </a:extLst>
+          </p:cNvPr>
+          <p:cNvSpPr/>
+          <p:nvPr/>
+        </p:nvSpPr>
+        <p:spPr>
+          <a:xfrm rot="7149250">
+            <a:off x="1849566" y="4021362"/>
+            <a:ext cx="1529861" cy="275308"/>
+          </a:xfrm>
+          <a:prstGeom prst="leftArrow">
+            <a:avLst/>
+          </a:prstGeom>
+          <a:solidFill>
+            <a:srgbClr val="FF0000"/>
+          </a:solidFill>
+          <a:ln>
+            <a:solidFill>
+              <a:srgbClr val="FF0000"/>
+            </a:solidFill>
+          </a:ln>
+        </p:spPr>
+        <p:style>
+          <a:lnRef idx="2">
+            <a:schemeClr val="accent1">
+              <a:shade val="15000"/>
+            </a:schemeClr>
+          </a:lnRef>
+          <a:fillRef idx="1">
+            <a:schemeClr val="accent1"/>
+          </a:fillRef>
+          <a:effectRef idx="0">
+            <a:schemeClr val="accent1"/>
+          </a:effectRef>
+          <a:fontRef idx="minor">
+            <a:schemeClr val="lt1"/>
+          </a:fontRef>
+        </p:style>
+        <p:txBody>
+          <a:bodyPr rtlCol="0" anchor="ctr"/>
+          <a:lstStyle/>
+          <a:p>
+            <a:pPr algn="ctr"/>
+            <a:endParaRPr lang="en-US"/>
+          </a:p>
+        </p:txBody>
+      </p:sp>
+    </p:spTree>
+    <p:extLst>
+      <p:ext uri="{BB962C8B-B14F-4D97-AF65-F5344CB8AC3E}">
+        <p14:creationId xmlns:p14="http://schemas.microsoft.com/office/powerpoint/2010/main" val="2771922186"/>
+      </p:ext>
+    </p:extLst>
+  </p:cSld>
+  <p:clrMapOvr>
+    <a:masterClrMapping/>
+  </p:clrMapOvr>
+</p:sld>
+</file>
+
+<file path=ppt/slides/slide18.xml><?xml version="1.0" encoding="utf-8"?>
+<p:sld xmlns:a="http://schemas.openxmlformats.org/drawingml/2006/main" xmlns:r="http://schemas.openxmlformats.org/officeDocument/2006/relationships" xmlns:p="http://schemas.openxmlformats.org/presentationml/2006/main">
+  <p:cSld>
+    <p:spTree>
+      <p:nvGrpSpPr>
+        <p:cNvPr id="1" name=""/>
+        <p:cNvGrpSpPr/>
+        <p:nvPr/>
+      </p:nvGrpSpPr>
+      <p:grpSpPr>
+        <a:xfrm>
+          <a:off x="0" y="0"/>
+          <a:ext cx="0" cy="0"/>
+          <a:chOff x="0" y="0"/>
+          <a:chExt cx="0" cy="0"/>
+        </a:xfrm>
+      </p:grpSpPr>
+      <p:sp>
+        <p:nvSpPr>
+          <p:cNvPr id="2" name="Title 1">
+            <a:extLst>
+              <a:ext uri="{FF2B5EF4-FFF2-40B4-BE49-F238E27FC236}">
                 <a16:creationId xmlns:a16="http://schemas.microsoft.com/office/drawing/2014/main" id="{C6EC5FF4-C466-968C-45F7-CF4000A5E83E}"/>
               </a:ext>
             </a:extLst>
@@ -55569,7 +55980,7 @@
 </p:sld>
 </file>
 
-<file path=ppt/slides/slide18.xml><?xml version="1.0" encoding="utf-8"?>
+<file path=ppt/slides/slide19.xml><?xml version="1.0" encoding="utf-8"?>
 <p:sld xmlns:a="http://schemas.openxmlformats.org/drawingml/2006/main" xmlns:r="http://schemas.openxmlformats.org/officeDocument/2006/relationships" xmlns:p="http://schemas.openxmlformats.org/presentationml/2006/main">
   <p:cSld>
     <p:spTree>
@@ -55690,7 +56101,400 @@
 </p:sld>
 </file>
 
-<file path=ppt/slides/slide19.xml><?xml version="1.0" encoding="utf-8"?>
+<file path=ppt/slides/slide2.xml><?xml version="1.0" encoding="utf-8"?>
+<p:sld xmlns:a="http://schemas.openxmlformats.org/drawingml/2006/main" xmlns:r="http://schemas.openxmlformats.org/officeDocument/2006/relationships" xmlns:p="http://schemas.openxmlformats.org/presentationml/2006/main">
+  <p:cSld>
+    <p:spTree>
+      <p:nvGrpSpPr>
+        <p:cNvPr id="1" name=""/>
+        <p:cNvGrpSpPr/>
+        <p:nvPr/>
+      </p:nvGrpSpPr>
+      <p:grpSpPr>
+        <a:xfrm>
+          <a:off x="0" y="0"/>
+          <a:ext cx="0" cy="0"/>
+          <a:chOff x="0" y="0"/>
+          <a:chExt cx="0" cy="0"/>
+        </a:xfrm>
+      </p:grpSpPr>
+      <p:sp>
+        <p:nvSpPr>
+          <p:cNvPr id="2" name="Title 1">
+            <a:extLst>
+              <a:ext uri="{FF2B5EF4-FFF2-40B4-BE49-F238E27FC236}">
+                <a16:creationId xmlns:a16="http://schemas.microsoft.com/office/drawing/2014/main" id="{8012A6D0-56EB-49EE-AC70-0F1B9B2EDA30}"/>
+              </a:ext>
+            </a:extLst>
+          </p:cNvPr>
+          <p:cNvSpPr>
+            <a:spLocks noGrp="1"/>
+          </p:cNvSpPr>
+          <p:nvPr>
+            <p:ph type="title"/>
+          </p:nvPr>
+        </p:nvSpPr>
+        <p:spPr>
+          <a:xfrm>
+            <a:off x="2361563" y="1830189"/>
+            <a:ext cx="7468875" cy="822400"/>
+          </a:xfrm>
+        </p:spPr>
+        <p:txBody>
+          <a:bodyPr/>
+          <a:lstStyle/>
+          <a:p>
+            <a:r>
+              <a:rPr lang="en-US" dirty="0"/>
+              <a:t>PowerPoint and Code</a:t>
+            </a:r>
+          </a:p>
+        </p:txBody>
+      </p:sp>
+      <p:sp>
+        <p:nvSpPr>
+          <p:cNvPr id="4" name="Subtitle 3">
+            <a:extLst>
+              <a:ext uri="{FF2B5EF4-FFF2-40B4-BE49-F238E27FC236}">
+                <a16:creationId xmlns:a16="http://schemas.microsoft.com/office/drawing/2014/main" id="{FCE4C0B2-E775-4300-9C1C-B204E2F812E0}"/>
+              </a:ext>
+            </a:extLst>
+          </p:cNvPr>
+          <p:cNvSpPr>
+            <a:spLocks noGrp="1"/>
+          </p:cNvSpPr>
+          <p:nvPr>
+            <p:ph type="subTitle" idx="1"/>
+          </p:nvPr>
+        </p:nvSpPr>
+        <p:spPr>
+          <a:xfrm>
+            <a:off x="3097951" y="2891671"/>
+            <a:ext cx="5500800" cy="559600"/>
+          </a:xfrm>
+        </p:spPr>
+        <p:txBody>
+          <a:bodyPr/>
+          <a:lstStyle/>
+          <a:p>
+            <a:r>
+              <a:rPr lang="en-US" dirty="0"/>
+              <a:t>Github.com/</a:t>
+            </a:r>
+            <a:r>
+              <a:rPr lang="en-US" dirty="0" err="1"/>
+              <a:t>EELabMan</a:t>
+            </a:r>
+            <a:endParaRPr lang="en-US" dirty="0"/>
+          </a:p>
+        </p:txBody>
+      </p:sp>
+      <p:sp>
+        <p:nvSpPr>
+          <p:cNvPr id="7" name="Subtitle 3">
+            <a:extLst>
+              <a:ext uri="{FF2B5EF4-FFF2-40B4-BE49-F238E27FC236}">
+                <a16:creationId xmlns:a16="http://schemas.microsoft.com/office/drawing/2014/main" id="{613D3C9A-8239-42D6-B021-1869D97AC86F}"/>
+              </a:ext>
+            </a:extLst>
+          </p:cNvPr>
+          <p:cNvSpPr txBox="1">
+            <a:spLocks/>
+          </p:cNvSpPr>
+          <p:nvPr/>
+        </p:nvSpPr>
+        <p:spPr>
+          <a:xfrm>
+            <a:off x="3097950" y="3901321"/>
+            <a:ext cx="6304668" cy="559600"/>
+          </a:xfrm>
+          <a:prstGeom prst="rect">
+            <a:avLst/>
+          </a:prstGeom>
+          <a:noFill/>
+          <a:ln>
+            <a:noFill/>
+          </a:ln>
+        </p:spPr>
+        <p:txBody>
+          <a:bodyPr spcFirstLastPara="1" wrap="square" lIns="91425" tIns="91425" rIns="91425" bIns="91425" anchor="ctr" anchorCtr="0">
+            <a:noAutofit/>
+          </a:bodyPr>
+          <a:lstStyle>
+            <a:defPPr marR="0" lvl="0" algn="l" rtl="0">
+              <a:lnSpc>
+                <a:spcPct val="100000"/>
+              </a:lnSpc>
+              <a:spcBef>
+                <a:spcPts val="0"/>
+              </a:spcBef>
+              <a:spcAft>
+                <a:spcPts val="0"/>
+              </a:spcAft>
+            </a:defPPr>
+            <a:lvl1pPr marL="457200" marR="0" lvl="0" indent="-317500" algn="ctr" rtl="0" eaLnBrk="1" hangingPunct="1">
+              <a:lnSpc>
+                <a:spcPct val="100000"/>
+              </a:lnSpc>
+              <a:spcBef>
+                <a:spcPts val="0"/>
+              </a:spcBef>
+              <a:spcAft>
+                <a:spcPts val="0"/>
+              </a:spcAft>
+              <a:buClr>
+                <a:schemeClr val="dk2"/>
+              </a:buClr>
+              <a:buSzPts val="1400"/>
+              <a:buFont typeface="Source Sans Pro"/>
+              <a:buNone/>
+              <a:defRPr sz="1867" b="0" i="0" u="none" strike="noStrike" cap="none">
+                <a:solidFill>
+                  <a:schemeClr val="dk2"/>
+                </a:solidFill>
+                <a:latin typeface="Source Sans Pro"/>
+                <a:ea typeface="Source Sans Pro"/>
+                <a:cs typeface="Source Sans Pro"/>
+                <a:sym typeface="Source Sans Pro"/>
+              </a:defRPr>
+            </a:lvl1pPr>
+            <a:lvl2pPr marL="914400" marR="0" lvl="1" indent="-317500" algn="ctr" rtl="0" eaLnBrk="1" hangingPunct="1">
+              <a:lnSpc>
+                <a:spcPct val="100000"/>
+              </a:lnSpc>
+              <a:spcBef>
+                <a:spcPts val="0"/>
+              </a:spcBef>
+              <a:spcAft>
+                <a:spcPts val="0"/>
+              </a:spcAft>
+              <a:buClr>
+                <a:schemeClr val="dk2"/>
+              </a:buClr>
+              <a:buSzPts val="1400"/>
+              <a:buFont typeface="Source Sans Pro"/>
+              <a:buNone/>
+              <a:defRPr sz="1867" b="0" i="0" u="none" strike="noStrike" cap="none">
+                <a:solidFill>
+                  <a:schemeClr val="dk2"/>
+                </a:solidFill>
+                <a:latin typeface="Source Sans Pro"/>
+                <a:ea typeface="Source Sans Pro"/>
+                <a:cs typeface="Source Sans Pro"/>
+                <a:sym typeface="Source Sans Pro"/>
+              </a:defRPr>
+            </a:lvl2pPr>
+            <a:lvl3pPr marL="1371600" marR="0" lvl="2" indent="-317500" algn="ctr" rtl="0" eaLnBrk="1" hangingPunct="1">
+              <a:lnSpc>
+                <a:spcPct val="100000"/>
+              </a:lnSpc>
+              <a:spcBef>
+                <a:spcPts val="2133"/>
+              </a:spcBef>
+              <a:spcAft>
+                <a:spcPts val="0"/>
+              </a:spcAft>
+              <a:buClr>
+                <a:schemeClr val="dk2"/>
+              </a:buClr>
+              <a:buSzPts val="1400"/>
+              <a:buFont typeface="Source Sans Pro"/>
+              <a:buNone/>
+              <a:defRPr sz="1867" b="0" i="0" u="none" strike="noStrike" cap="none">
+                <a:solidFill>
+                  <a:schemeClr val="dk2"/>
+                </a:solidFill>
+                <a:latin typeface="Source Sans Pro"/>
+                <a:ea typeface="Source Sans Pro"/>
+                <a:cs typeface="Source Sans Pro"/>
+                <a:sym typeface="Source Sans Pro"/>
+              </a:defRPr>
+            </a:lvl3pPr>
+            <a:lvl4pPr marL="1828800" marR="0" lvl="3" indent="-317500" algn="ctr" rtl="0" eaLnBrk="1" hangingPunct="1">
+              <a:lnSpc>
+                <a:spcPct val="100000"/>
+              </a:lnSpc>
+              <a:spcBef>
+                <a:spcPts val="2133"/>
+              </a:spcBef>
+              <a:spcAft>
+                <a:spcPts val="0"/>
+              </a:spcAft>
+              <a:buClr>
+                <a:schemeClr val="dk2"/>
+              </a:buClr>
+              <a:buSzPts val="1400"/>
+              <a:buFont typeface="Source Sans Pro"/>
+              <a:buNone/>
+              <a:defRPr sz="1867" b="0" i="0" u="none" strike="noStrike" cap="none">
+                <a:solidFill>
+                  <a:schemeClr val="dk2"/>
+                </a:solidFill>
+                <a:latin typeface="Source Sans Pro"/>
+                <a:ea typeface="Source Sans Pro"/>
+                <a:cs typeface="Source Sans Pro"/>
+                <a:sym typeface="Source Sans Pro"/>
+              </a:defRPr>
+            </a:lvl4pPr>
+            <a:lvl5pPr marL="2286000" marR="0" lvl="4" indent="-317500" algn="ctr" rtl="0" eaLnBrk="1" hangingPunct="1">
+              <a:lnSpc>
+                <a:spcPct val="100000"/>
+              </a:lnSpc>
+              <a:spcBef>
+                <a:spcPts val="2133"/>
+              </a:spcBef>
+              <a:spcAft>
+                <a:spcPts val="0"/>
+              </a:spcAft>
+              <a:buClr>
+                <a:schemeClr val="dk2"/>
+              </a:buClr>
+              <a:buSzPts val="1400"/>
+              <a:buFont typeface="Source Sans Pro"/>
+              <a:buNone/>
+              <a:defRPr sz="1867" b="0" i="0" u="none" strike="noStrike" cap="none">
+                <a:solidFill>
+                  <a:schemeClr val="dk2"/>
+                </a:solidFill>
+                <a:latin typeface="Source Sans Pro"/>
+                <a:ea typeface="Source Sans Pro"/>
+                <a:cs typeface="Source Sans Pro"/>
+                <a:sym typeface="Source Sans Pro"/>
+              </a:defRPr>
+            </a:lvl5pPr>
+            <a:lvl6pPr marL="2743200" marR="0" lvl="5" indent="-317500" algn="ctr" rtl="0" eaLnBrk="1" hangingPunct="1">
+              <a:lnSpc>
+                <a:spcPct val="100000"/>
+              </a:lnSpc>
+              <a:spcBef>
+                <a:spcPts val="2133"/>
+              </a:spcBef>
+              <a:spcAft>
+                <a:spcPts val="0"/>
+              </a:spcAft>
+              <a:buClr>
+                <a:schemeClr val="dk2"/>
+              </a:buClr>
+              <a:buSzPts val="1400"/>
+              <a:buFont typeface="Source Sans Pro"/>
+              <a:buNone/>
+              <a:defRPr sz="1867" b="0" i="0" u="none" strike="noStrike" cap="none">
+                <a:solidFill>
+                  <a:schemeClr val="dk2"/>
+                </a:solidFill>
+                <a:latin typeface="Source Sans Pro"/>
+                <a:ea typeface="Source Sans Pro"/>
+                <a:cs typeface="Source Sans Pro"/>
+                <a:sym typeface="Source Sans Pro"/>
+              </a:defRPr>
+            </a:lvl6pPr>
+            <a:lvl7pPr marL="3200400" marR="0" lvl="6" indent="-317500" algn="ctr" rtl="0" eaLnBrk="1" hangingPunct="1">
+              <a:lnSpc>
+                <a:spcPct val="100000"/>
+              </a:lnSpc>
+              <a:spcBef>
+                <a:spcPts val="2133"/>
+              </a:spcBef>
+              <a:spcAft>
+                <a:spcPts val="0"/>
+              </a:spcAft>
+              <a:buClr>
+                <a:schemeClr val="dk2"/>
+              </a:buClr>
+              <a:buSzPts val="1400"/>
+              <a:buFont typeface="Source Sans Pro"/>
+              <a:buNone/>
+              <a:defRPr sz="1867" b="0" i="0" u="none" strike="noStrike" cap="none">
+                <a:solidFill>
+                  <a:schemeClr val="dk2"/>
+                </a:solidFill>
+                <a:latin typeface="Source Sans Pro"/>
+                <a:ea typeface="Source Sans Pro"/>
+                <a:cs typeface="Source Sans Pro"/>
+                <a:sym typeface="Source Sans Pro"/>
+              </a:defRPr>
+            </a:lvl7pPr>
+            <a:lvl8pPr marL="3657600" marR="0" lvl="7" indent="-317500" algn="ctr" rtl="0" eaLnBrk="1" hangingPunct="1">
+              <a:lnSpc>
+                <a:spcPct val="100000"/>
+              </a:lnSpc>
+              <a:spcBef>
+                <a:spcPts val="2133"/>
+              </a:spcBef>
+              <a:spcAft>
+                <a:spcPts val="0"/>
+              </a:spcAft>
+              <a:buClr>
+                <a:schemeClr val="dk2"/>
+              </a:buClr>
+              <a:buSzPts val="1400"/>
+              <a:buFont typeface="Source Sans Pro"/>
+              <a:buNone/>
+              <a:defRPr sz="1867" b="0" i="0" u="none" strike="noStrike" cap="none">
+                <a:solidFill>
+                  <a:schemeClr val="dk2"/>
+                </a:solidFill>
+                <a:latin typeface="Source Sans Pro"/>
+                <a:ea typeface="Source Sans Pro"/>
+                <a:cs typeface="Source Sans Pro"/>
+                <a:sym typeface="Source Sans Pro"/>
+              </a:defRPr>
+            </a:lvl8pPr>
+            <a:lvl9pPr marL="4114800" marR="0" lvl="8" indent="-317500" algn="ctr" rtl="0" eaLnBrk="1" hangingPunct="1">
+              <a:lnSpc>
+                <a:spcPct val="100000"/>
+              </a:lnSpc>
+              <a:spcBef>
+                <a:spcPts val="2133"/>
+              </a:spcBef>
+              <a:spcAft>
+                <a:spcPts val="2133"/>
+              </a:spcAft>
+              <a:buClr>
+                <a:schemeClr val="dk2"/>
+              </a:buClr>
+              <a:buSzPts val="1400"/>
+              <a:buFont typeface="Source Sans Pro"/>
+              <a:buNone/>
+              <a:defRPr sz="1867" b="0" i="0" u="none" strike="noStrike" cap="none">
+                <a:solidFill>
+                  <a:schemeClr val="dk2"/>
+                </a:solidFill>
+                <a:latin typeface="Source Sans Pro"/>
+                <a:ea typeface="Source Sans Pro"/>
+                <a:cs typeface="Source Sans Pro"/>
+                <a:sym typeface="Source Sans Pro"/>
+              </a:defRPr>
+            </a:lvl9pPr>
+          </a:lstStyle>
+          <a:p>
+            <a:r>
+              <a:rPr lang="en-US" dirty="0"/>
+              <a:t>Go To Repositories and find LoRa-Radio</a:t>
+            </a:r>
+          </a:p>
+          <a:p>
+            <a:r>
+              <a:rPr lang="en-US" dirty="0"/>
+              <a:t>Click the green button to download the .zip file and extract it on your computer.</a:t>
+            </a:r>
+          </a:p>
+        </p:txBody>
+      </p:sp>
+    </p:spTree>
+    <p:extLst>
+      <p:ext uri="{BB962C8B-B14F-4D97-AF65-F5344CB8AC3E}">
+        <p14:creationId xmlns:p14="http://schemas.microsoft.com/office/powerpoint/2010/main" val="86687579"/>
+      </p:ext>
+    </p:extLst>
+  </p:cSld>
+  <p:clrMapOvr>
+    <a:masterClrMapping/>
+  </p:clrMapOvr>
+</p:sld>
+</file>
+
+<file path=ppt/slides/slide20.xml><?xml version="1.0" encoding="utf-8"?>
 <p:sld xmlns:a="http://schemas.openxmlformats.org/drawingml/2006/main" xmlns:r="http://schemas.openxmlformats.org/officeDocument/2006/relationships" xmlns:p="http://schemas.openxmlformats.org/presentationml/2006/main">
   <p:cSld>
     <p:spTree>
@@ -55829,400 +56633,7 @@
 </p:sld>
 </file>
 
-<file path=ppt/slides/slide2.xml><?xml version="1.0" encoding="utf-8"?>
-<p:sld xmlns:a="http://schemas.openxmlformats.org/drawingml/2006/main" xmlns:r="http://schemas.openxmlformats.org/officeDocument/2006/relationships" xmlns:p="http://schemas.openxmlformats.org/presentationml/2006/main">
-  <p:cSld>
-    <p:spTree>
-      <p:nvGrpSpPr>
-        <p:cNvPr id="1" name=""/>
-        <p:cNvGrpSpPr/>
-        <p:nvPr/>
-      </p:nvGrpSpPr>
-      <p:grpSpPr>
-        <a:xfrm>
-          <a:off x="0" y="0"/>
-          <a:ext cx="0" cy="0"/>
-          <a:chOff x="0" y="0"/>
-          <a:chExt cx="0" cy="0"/>
-        </a:xfrm>
-      </p:grpSpPr>
-      <p:sp>
-        <p:nvSpPr>
-          <p:cNvPr id="2" name="Title 1">
-            <a:extLst>
-              <a:ext uri="{FF2B5EF4-FFF2-40B4-BE49-F238E27FC236}">
-                <a16:creationId xmlns:a16="http://schemas.microsoft.com/office/drawing/2014/main" id="{8012A6D0-56EB-49EE-AC70-0F1B9B2EDA30}"/>
-              </a:ext>
-            </a:extLst>
-          </p:cNvPr>
-          <p:cNvSpPr>
-            <a:spLocks noGrp="1"/>
-          </p:cNvSpPr>
-          <p:nvPr>
-            <p:ph type="title"/>
-          </p:nvPr>
-        </p:nvSpPr>
-        <p:spPr>
-          <a:xfrm>
-            <a:off x="2361563" y="1830189"/>
-            <a:ext cx="7468875" cy="822400"/>
-          </a:xfrm>
-        </p:spPr>
-        <p:txBody>
-          <a:bodyPr/>
-          <a:lstStyle/>
-          <a:p>
-            <a:r>
-              <a:rPr lang="en-US" dirty="0"/>
-              <a:t>PowerPoint and Code</a:t>
-            </a:r>
-          </a:p>
-        </p:txBody>
-      </p:sp>
-      <p:sp>
-        <p:nvSpPr>
-          <p:cNvPr id="4" name="Subtitle 3">
-            <a:extLst>
-              <a:ext uri="{FF2B5EF4-FFF2-40B4-BE49-F238E27FC236}">
-                <a16:creationId xmlns:a16="http://schemas.microsoft.com/office/drawing/2014/main" id="{FCE4C0B2-E775-4300-9C1C-B204E2F812E0}"/>
-              </a:ext>
-            </a:extLst>
-          </p:cNvPr>
-          <p:cNvSpPr>
-            <a:spLocks noGrp="1"/>
-          </p:cNvSpPr>
-          <p:nvPr>
-            <p:ph type="subTitle" idx="1"/>
-          </p:nvPr>
-        </p:nvSpPr>
-        <p:spPr>
-          <a:xfrm>
-            <a:off x="3097951" y="2891671"/>
-            <a:ext cx="5500800" cy="559600"/>
-          </a:xfrm>
-        </p:spPr>
-        <p:txBody>
-          <a:bodyPr/>
-          <a:lstStyle/>
-          <a:p>
-            <a:r>
-              <a:rPr lang="en-US" dirty="0"/>
-              <a:t>Github.com/</a:t>
-            </a:r>
-            <a:r>
-              <a:rPr lang="en-US" dirty="0" err="1"/>
-              <a:t>EELabMan</a:t>
-            </a:r>
-            <a:endParaRPr lang="en-US" dirty="0"/>
-          </a:p>
-        </p:txBody>
-      </p:sp>
-      <p:sp>
-        <p:nvSpPr>
-          <p:cNvPr id="7" name="Subtitle 3">
-            <a:extLst>
-              <a:ext uri="{FF2B5EF4-FFF2-40B4-BE49-F238E27FC236}">
-                <a16:creationId xmlns:a16="http://schemas.microsoft.com/office/drawing/2014/main" id="{613D3C9A-8239-42D6-B021-1869D97AC86F}"/>
-              </a:ext>
-            </a:extLst>
-          </p:cNvPr>
-          <p:cNvSpPr txBox="1">
-            <a:spLocks/>
-          </p:cNvSpPr>
-          <p:nvPr/>
-        </p:nvSpPr>
-        <p:spPr>
-          <a:xfrm>
-            <a:off x="3097950" y="3901321"/>
-            <a:ext cx="6304668" cy="559600"/>
-          </a:xfrm>
-          <a:prstGeom prst="rect">
-            <a:avLst/>
-          </a:prstGeom>
-          <a:noFill/>
-          <a:ln>
-            <a:noFill/>
-          </a:ln>
-        </p:spPr>
-        <p:txBody>
-          <a:bodyPr spcFirstLastPara="1" wrap="square" lIns="91425" tIns="91425" rIns="91425" bIns="91425" anchor="ctr" anchorCtr="0">
-            <a:noAutofit/>
-          </a:bodyPr>
-          <a:lstStyle>
-            <a:defPPr marR="0" lvl="0" algn="l" rtl="0">
-              <a:lnSpc>
-                <a:spcPct val="100000"/>
-              </a:lnSpc>
-              <a:spcBef>
-                <a:spcPts val="0"/>
-              </a:spcBef>
-              <a:spcAft>
-                <a:spcPts val="0"/>
-              </a:spcAft>
-            </a:defPPr>
-            <a:lvl1pPr marL="457200" marR="0" lvl="0" indent="-317500" algn="ctr" rtl="0" eaLnBrk="1" hangingPunct="1">
-              <a:lnSpc>
-                <a:spcPct val="100000"/>
-              </a:lnSpc>
-              <a:spcBef>
-                <a:spcPts val="0"/>
-              </a:spcBef>
-              <a:spcAft>
-                <a:spcPts val="0"/>
-              </a:spcAft>
-              <a:buClr>
-                <a:schemeClr val="dk2"/>
-              </a:buClr>
-              <a:buSzPts val="1400"/>
-              <a:buFont typeface="Source Sans Pro"/>
-              <a:buNone/>
-              <a:defRPr sz="1867" b="0" i="0" u="none" strike="noStrike" cap="none">
-                <a:solidFill>
-                  <a:schemeClr val="dk2"/>
-                </a:solidFill>
-                <a:latin typeface="Source Sans Pro"/>
-                <a:ea typeface="Source Sans Pro"/>
-                <a:cs typeface="Source Sans Pro"/>
-                <a:sym typeface="Source Sans Pro"/>
-              </a:defRPr>
-            </a:lvl1pPr>
-            <a:lvl2pPr marL="914400" marR="0" lvl="1" indent="-317500" algn="ctr" rtl="0" eaLnBrk="1" hangingPunct="1">
-              <a:lnSpc>
-                <a:spcPct val="100000"/>
-              </a:lnSpc>
-              <a:spcBef>
-                <a:spcPts val="0"/>
-              </a:spcBef>
-              <a:spcAft>
-                <a:spcPts val="0"/>
-              </a:spcAft>
-              <a:buClr>
-                <a:schemeClr val="dk2"/>
-              </a:buClr>
-              <a:buSzPts val="1400"/>
-              <a:buFont typeface="Source Sans Pro"/>
-              <a:buNone/>
-              <a:defRPr sz="1867" b="0" i="0" u="none" strike="noStrike" cap="none">
-                <a:solidFill>
-                  <a:schemeClr val="dk2"/>
-                </a:solidFill>
-                <a:latin typeface="Source Sans Pro"/>
-                <a:ea typeface="Source Sans Pro"/>
-                <a:cs typeface="Source Sans Pro"/>
-                <a:sym typeface="Source Sans Pro"/>
-              </a:defRPr>
-            </a:lvl2pPr>
-            <a:lvl3pPr marL="1371600" marR="0" lvl="2" indent="-317500" algn="ctr" rtl="0" eaLnBrk="1" hangingPunct="1">
-              <a:lnSpc>
-                <a:spcPct val="100000"/>
-              </a:lnSpc>
-              <a:spcBef>
-                <a:spcPts val="2133"/>
-              </a:spcBef>
-              <a:spcAft>
-                <a:spcPts val="0"/>
-              </a:spcAft>
-              <a:buClr>
-                <a:schemeClr val="dk2"/>
-              </a:buClr>
-              <a:buSzPts val="1400"/>
-              <a:buFont typeface="Source Sans Pro"/>
-              <a:buNone/>
-              <a:defRPr sz="1867" b="0" i="0" u="none" strike="noStrike" cap="none">
-                <a:solidFill>
-                  <a:schemeClr val="dk2"/>
-                </a:solidFill>
-                <a:latin typeface="Source Sans Pro"/>
-                <a:ea typeface="Source Sans Pro"/>
-                <a:cs typeface="Source Sans Pro"/>
-                <a:sym typeface="Source Sans Pro"/>
-              </a:defRPr>
-            </a:lvl3pPr>
-            <a:lvl4pPr marL="1828800" marR="0" lvl="3" indent="-317500" algn="ctr" rtl="0" eaLnBrk="1" hangingPunct="1">
-              <a:lnSpc>
-                <a:spcPct val="100000"/>
-              </a:lnSpc>
-              <a:spcBef>
-                <a:spcPts val="2133"/>
-              </a:spcBef>
-              <a:spcAft>
-                <a:spcPts val="0"/>
-              </a:spcAft>
-              <a:buClr>
-                <a:schemeClr val="dk2"/>
-              </a:buClr>
-              <a:buSzPts val="1400"/>
-              <a:buFont typeface="Source Sans Pro"/>
-              <a:buNone/>
-              <a:defRPr sz="1867" b="0" i="0" u="none" strike="noStrike" cap="none">
-                <a:solidFill>
-                  <a:schemeClr val="dk2"/>
-                </a:solidFill>
-                <a:latin typeface="Source Sans Pro"/>
-                <a:ea typeface="Source Sans Pro"/>
-                <a:cs typeface="Source Sans Pro"/>
-                <a:sym typeface="Source Sans Pro"/>
-              </a:defRPr>
-            </a:lvl4pPr>
-            <a:lvl5pPr marL="2286000" marR="0" lvl="4" indent="-317500" algn="ctr" rtl="0" eaLnBrk="1" hangingPunct="1">
-              <a:lnSpc>
-                <a:spcPct val="100000"/>
-              </a:lnSpc>
-              <a:spcBef>
-                <a:spcPts val="2133"/>
-              </a:spcBef>
-              <a:spcAft>
-                <a:spcPts val="0"/>
-              </a:spcAft>
-              <a:buClr>
-                <a:schemeClr val="dk2"/>
-              </a:buClr>
-              <a:buSzPts val="1400"/>
-              <a:buFont typeface="Source Sans Pro"/>
-              <a:buNone/>
-              <a:defRPr sz="1867" b="0" i="0" u="none" strike="noStrike" cap="none">
-                <a:solidFill>
-                  <a:schemeClr val="dk2"/>
-                </a:solidFill>
-                <a:latin typeface="Source Sans Pro"/>
-                <a:ea typeface="Source Sans Pro"/>
-                <a:cs typeface="Source Sans Pro"/>
-                <a:sym typeface="Source Sans Pro"/>
-              </a:defRPr>
-            </a:lvl5pPr>
-            <a:lvl6pPr marL="2743200" marR="0" lvl="5" indent="-317500" algn="ctr" rtl="0" eaLnBrk="1" hangingPunct="1">
-              <a:lnSpc>
-                <a:spcPct val="100000"/>
-              </a:lnSpc>
-              <a:spcBef>
-                <a:spcPts val="2133"/>
-              </a:spcBef>
-              <a:spcAft>
-                <a:spcPts val="0"/>
-              </a:spcAft>
-              <a:buClr>
-                <a:schemeClr val="dk2"/>
-              </a:buClr>
-              <a:buSzPts val="1400"/>
-              <a:buFont typeface="Source Sans Pro"/>
-              <a:buNone/>
-              <a:defRPr sz="1867" b="0" i="0" u="none" strike="noStrike" cap="none">
-                <a:solidFill>
-                  <a:schemeClr val="dk2"/>
-                </a:solidFill>
-                <a:latin typeface="Source Sans Pro"/>
-                <a:ea typeface="Source Sans Pro"/>
-                <a:cs typeface="Source Sans Pro"/>
-                <a:sym typeface="Source Sans Pro"/>
-              </a:defRPr>
-            </a:lvl6pPr>
-            <a:lvl7pPr marL="3200400" marR="0" lvl="6" indent="-317500" algn="ctr" rtl="0" eaLnBrk="1" hangingPunct="1">
-              <a:lnSpc>
-                <a:spcPct val="100000"/>
-              </a:lnSpc>
-              <a:spcBef>
-                <a:spcPts val="2133"/>
-              </a:spcBef>
-              <a:spcAft>
-                <a:spcPts val="0"/>
-              </a:spcAft>
-              <a:buClr>
-                <a:schemeClr val="dk2"/>
-              </a:buClr>
-              <a:buSzPts val="1400"/>
-              <a:buFont typeface="Source Sans Pro"/>
-              <a:buNone/>
-              <a:defRPr sz="1867" b="0" i="0" u="none" strike="noStrike" cap="none">
-                <a:solidFill>
-                  <a:schemeClr val="dk2"/>
-                </a:solidFill>
-                <a:latin typeface="Source Sans Pro"/>
-                <a:ea typeface="Source Sans Pro"/>
-                <a:cs typeface="Source Sans Pro"/>
-                <a:sym typeface="Source Sans Pro"/>
-              </a:defRPr>
-            </a:lvl7pPr>
-            <a:lvl8pPr marL="3657600" marR="0" lvl="7" indent="-317500" algn="ctr" rtl="0" eaLnBrk="1" hangingPunct="1">
-              <a:lnSpc>
-                <a:spcPct val="100000"/>
-              </a:lnSpc>
-              <a:spcBef>
-                <a:spcPts val="2133"/>
-              </a:spcBef>
-              <a:spcAft>
-                <a:spcPts val="0"/>
-              </a:spcAft>
-              <a:buClr>
-                <a:schemeClr val="dk2"/>
-              </a:buClr>
-              <a:buSzPts val="1400"/>
-              <a:buFont typeface="Source Sans Pro"/>
-              <a:buNone/>
-              <a:defRPr sz="1867" b="0" i="0" u="none" strike="noStrike" cap="none">
-                <a:solidFill>
-                  <a:schemeClr val="dk2"/>
-                </a:solidFill>
-                <a:latin typeface="Source Sans Pro"/>
-                <a:ea typeface="Source Sans Pro"/>
-                <a:cs typeface="Source Sans Pro"/>
-                <a:sym typeface="Source Sans Pro"/>
-              </a:defRPr>
-            </a:lvl8pPr>
-            <a:lvl9pPr marL="4114800" marR="0" lvl="8" indent="-317500" algn="ctr" rtl="0" eaLnBrk="1" hangingPunct="1">
-              <a:lnSpc>
-                <a:spcPct val="100000"/>
-              </a:lnSpc>
-              <a:spcBef>
-                <a:spcPts val="2133"/>
-              </a:spcBef>
-              <a:spcAft>
-                <a:spcPts val="2133"/>
-              </a:spcAft>
-              <a:buClr>
-                <a:schemeClr val="dk2"/>
-              </a:buClr>
-              <a:buSzPts val="1400"/>
-              <a:buFont typeface="Source Sans Pro"/>
-              <a:buNone/>
-              <a:defRPr sz="1867" b="0" i="0" u="none" strike="noStrike" cap="none">
-                <a:solidFill>
-                  <a:schemeClr val="dk2"/>
-                </a:solidFill>
-                <a:latin typeface="Source Sans Pro"/>
-                <a:ea typeface="Source Sans Pro"/>
-                <a:cs typeface="Source Sans Pro"/>
-                <a:sym typeface="Source Sans Pro"/>
-              </a:defRPr>
-            </a:lvl9pPr>
-          </a:lstStyle>
-          <a:p>
-            <a:r>
-              <a:rPr lang="en-US" dirty="0"/>
-              <a:t>Go To Repositories and find LoRa-Radio</a:t>
-            </a:r>
-          </a:p>
-          <a:p>
-            <a:r>
-              <a:rPr lang="en-US" dirty="0"/>
-              <a:t>Click the green button to download the .zip file and extract it on your computer.</a:t>
-            </a:r>
-          </a:p>
-        </p:txBody>
-      </p:sp>
-    </p:spTree>
-    <p:extLst>
-      <p:ext uri="{BB962C8B-B14F-4D97-AF65-F5344CB8AC3E}">
-        <p14:creationId xmlns:p14="http://schemas.microsoft.com/office/powerpoint/2010/main" val="86687579"/>
-      </p:ext>
-    </p:extLst>
-  </p:cSld>
-  <p:clrMapOvr>
-    <a:masterClrMapping/>
-  </p:clrMapOvr>
-</p:sld>
-</file>
-
-<file path=ppt/slides/slide20.xml><?xml version="1.0" encoding="utf-8"?>
+<file path=ppt/slides/slide21.xml><?xml version="1.0" encoding="utf-8"?>
 <p:sld xmlns:a="http://schemas.openxmlformats.org/drawingml/2006/main" xmlns:r="http://schemas.openxmlformats.org/officeDocument/2006/relationships" xmlns:p="http://schemas.openxmlformats.org/presentationml/2006/main">
   <p:cSld>
     <p:spTree>

</xml_diff>